<commit_message>
Revise the homework9-1 slide
</commit_message>
<xml_diff>
--- a/homework/hw9/9-1/SED-Hw9_1.pptx
+++ b/homework/hw9/9-1/SED-Hw9_1.pptx
@@ -5,17 +5,18 @@
     <p:sldMasterId id="2147483648" r:id="rId1"/>
   </p:sldMasterIdLst>
   <p:notesMasterIdLst>
-    <p:notesMasterId r:id="rId10"/>
+    <p:notesMasterId r:id="rId11"/>
   </p:notesMasterIdLst>
   <p:sldIdLst>
     <p:sldId id="256" r:id="rId2"/>
-    <p:sldId id="257" r:id="rId3"/>
-    <p:sldId id="258" r:id="rId4"/>
-    <p:sldId id="268" r:id="rId5"/>
-    <p:sldId id="269" r:id="rId6"/>
-    <p:sldId id="265" r:id="rId7"/>
-    <p:sldId id="267" r:id="rId8"/>
-    <p:sldId id="266" r:id="rId9"/>
+    <p:sldId id="270" r:id="rId3"/>
+    <p:sldId id="257" r:id="rId4"/>
+    <p:sldId id="258" r:id="rId5"/>
+    <p:sldId id="268" r:id="rId6"/>
+    <p:sldId id="269" r:id="rId7"/>
+    <p:sldId id="265" r:id="rId8"/>
+    <p:sldId id="267" r:id="rId9"/>
+    <p:sldId id="266" r:id="rId10"/>
   </p:sldIdLst>
   <p:sldSz cx="9144000" cy="6858000" type="screen4x3"/>
   <p:notesSz cx="6858000" cy="9144000"/>
@@ -116,7 +117,7 @@
   </p:defaultTextStyle>
   <p:extLst>
     <p:ext uri="{EFAFB233-063F-42B5-8137-9DF3F51BA10A}">
-      <p15:sldGuideLst xmlns:p15="http://schemas.microsoft.com/office/powerpoint/2012/main">
+      <p15:sldGuideLst xmlns:p15="http://schemas.microsoft.com/office/powerpoint/2012/main" xmlns="">
         <p15:guide id="1" orient="horz" pos="2160">
           <p15:clr>
             <a:srgbClr val="A4A3A4"/>
@@ -215,7 +216,7 @@
           <a:p>
             <a:fld id="{08F08EEC-4E68-4B1E-A54F-FE9EE83487B5}" type="datetimeFigureOut">
               <a:rPr lang="zh-TW" altLang="en-US" smtClean="0"/>
-              <a:t>2014/4/28</a:t>
+              <a:t>2014/4/29</a:t>
             </a:fld>
             <a:endParaRPr lang="zh-TW" altLang="en-US"/>
           </a:p>
@@ -548,7 +549,7 @@
           <a:p>
             <a:fld id="{E95B78B5-4FA1-4F88-8584-7CECA9E79809}" type="slidenum">
               <a:rPr lang="zh-TW" altLang="en-US" smtClean="0"/>
-              <a:t>3</a:t>
+              <a:t>4</a:t>
             </a:fld>
             <a:endParaRPr lang="zh-TW" altLang="en-US"/>
           </a:p>
@@ -632,7 +633,7 @@
           <a:p>
             <a:fld id="{E95B78B5-4FA1-4F88-8584-7CECA9E79809}" type="slidenum">
               <a:rPr lang="zh-TW" altLang="en-US" smtClean="0"/>
-              <a:t>4</a:t>
+              <a:t>5</a:t>
             </a:fld>
             <a:endParaRPr lang="zh-TW" altLang="en-US"/>
           </a:p>
@@ -716,7 +717,7 @@
           <a:p>
             <a:fld id="{E95B78B5-4FA1-4F88-8584-7CECA9E79809}" type="slidenum">
               <a:rPr lang="zh-TW" altLang="en-US" smtClean="0"/>
-              <a:t>5</a:t>
+              <a:t>6</a:t>
             </a:fld>
             <a:endParaRPr lang="zh-TW" altLang="en-US"/>
           </a:p>
@@ -800,7 +801,7 @@
           <a:p>
             <a:fld id="{E95B78B5-4FA1-4F88-8584-7CECA9E79809}" type="slidenum">
               <a:rPr lang="zh-TW" altLang="en-US" smtClean="0"/>
-              <a:t>8</a:t>
+              <a:t>9</a:t>
             </a:fld>
             <a:endParaRPr lang="zh-TW" altLang="en-US"/>
           </a:p>
@@ -1000,7 +1001,7 @@
           <a:p>
             <a:fld id="{FF772CDC-D323-49C0-8BF8-D1F0F675A659}" type="datetimeFigureOut">
               <a:rPr lang="zh-TW" altLang="en-US" smtClean="0"/>
-              <a:t>2014/4/28</a:t>
+              <a:t>2014/4/29</a:t>
             </a:fld>
             <a:endParaRPr lang="zh-TW" altLang="en-US"/>
           </a:p>
@@ -1170,7 +1171,7 @@
           <a:p>
             <a:fld id="{FF772CDC-D323-49C0-8BF8-D1F0F675A659}" type="datetimeFigureOut">
               <a:rPr lang="zh-TW" altLang="en-US" smtClean="0"/>
-              <a:t>2014/4/28</a:t>
+              <a:t>2014/4/29</a:t>
             </a:fld>
             <a:endParaRPr lang="zh-TW" altLang="en-US"/>
           </a:p>
@@ -1350,7 +1351,7 @@
           <a:p>
             <a:fld id="{FF772CDC-D323-49C0-8BF8-D1F0F675A659}" type="datetimeFigureOut">
               <a:rPr lang="zh-TW" altLang="en-US" smtClean="0"/>
-              <a:t>2014/4/28</a:t>
+              <a:t>2014/4/29</a:t>
             </a:fld>
             <a:endParaRPr lang="zh-TW" altLang="en-US"/>
           </a:p>
@@ -1520,7 +1521,7 @@
           <a:p>
             <a:fld id="{FF772CDC-D323-49C0-8BF8-D1F0F675A659}" type="datetimeFigureOut">
               <a:rPr lang="zh-TW" altLang="en-US" smtClean="0"/>
-              <a:t>2014/4/28</a:t>
+              <a:t>2014/4/29</a:t>
             </a:fld>
             <a:endParaRPr lang="zh-TW" altLang="en-US"/>
           </a:p>
@@ -1766,7 +1767,7 @@
           <a:p>
             <a:fld id="{FF772CDC-D323-49C0-8BF8-D1F0F675A659}" type="datetimeFigureOut">
               <a:rPr lang="zh-TW" altLang="en-US" smtClean="0"/>
-              <a:t>2014/4/28</a:t>
+              <a:t>2014/4/29</a:t>
             </a:fld>
             <a:endParaRPr lang="zh-TW" altLang="en-US"/>
           </a:p>
@@ -2054,7 +2055,7 @@
           <a:p>
             <a:fld id="{FF772CDC-D323-49C0-8BF8-D1F0F675A659}" type="datetimeFigureOut">
               <a:rPr lang="zh-TW" altLang="en-US" smtClean="0"/>
-              <a:t>2014/4/28</a:t>
+              <a:t>2014/4/29</a:t>
             </a:fld>
             <a:endParaRPr lang="zh-TW" altLang="en-US"/>
           </a:p>
@@ -2476,7 +2477,7 @@
           <a:p>
             <a:fld id="{FF772CDC-D323-49C0-8BF8-D1F0F675A659}" type="datetimeFigureOut">
               <a:rPr lang="zh-TW" altLang="en-US" smtClean="0"/>
-              <a:t>2014/4/28</a:t>
+              <a:t>2014/4/29</a:t>
             </a:fld>
             <a:endParaRPr lang="zh-TW" altLang="en-US"/>
           </a:p>
@@ -2594,7 +2595,7 @@
           <a:p>
             <a:fld id="{FF772CDC-D323-49C0-8BF8-D1F0F675A659}" type="datetimeFigureOut">
               <a:rPr lang="zh-TW" altLang="en-US" smtClean="0"/>
-              <a:t>2014/4/28</a:t>
+              <a:t>2014/4/29</a:t>
             </a:fld>
             <a:endParaRPr lang="zh-TW" altLang="en-US"/>
           </a:p>
@@ -2689,7 +2690,7 @@
           <a:p>
             <a:fld id="{FF772CDC-D323-49C0-8BF8-D1F0F675A659}" type="datetimeFigureOut">
               <a:rPr lang="zh-TW" altLang="en-US" smtClean="0"/>
-              <a:t>2014/4/28</a:t>
+              <a:t>2014/4/29</a:t>
             </a:fld>
             <a:endParaRPr lang="zh-TW" altLang="en-US"/>
           </a:p>
@@ -2966,7 +2967,7 @@
           <a:p>
             <a:fld id="{FF772CDC-D323-49C0-8BF8-D1F0F675A659}" type="datetimeFigureOut">
               <a:rPr lang="zh-TW" altLang="en-US" smtClean="0"/>
-              <a:t>2014/4/28</a:t>
+              <a:t>2014/4/29</a:t>
             </a:fld>
             <a:endParaRPr lang="zh-TW" altLang="en-US"/>
           </a:p>
@@ -3219,7 +3220,7 @@
           <a:p>
             <a:fld id="{FF772CDC-D323-49C0-8BF8-D1F0F675A659}" type="datetimeFigureOut">
               <a:rPr lang="zh-TW" altLang="en-US" smtClean="0"/>
-              <a:t>2014/4/28</a:t>
+              <a:t>2014/4/29</a:t>
             </a:fld>
             <a:endParaRPr lang="zh-TW" altLang="en-US"/>
           </a:p>
@@ -3432,7 +3433,7 @@
           <a:p>
             <a:fld id="{FF772CDC-D323-49C0-8BF8-D1F0F675A659}" type="datetimeFigureOut">
               <a:rPr lang="zh-TW" altLang="en-US" smtClean="0"/>
-              <a:t>2014/4/28</a:t>
+              <a:t>2014/4/29</a:t>
             </a:fld>
             <a:endParaRPr lang="zh-TW" altLang="en-US"/>
           </a:p>
@@ -3903,29 +3904,111 @@
           </a:bodyPr>
           <a:lstStyle/>
           <a:p>
+            <a:r>
+              <a:rPr lang="en-US" altLang="zh-TW" sz="4200" dirty="0" smtClean="0"/>
+              <a:t>Class diagram of direct coding</a:t>
+            </a:r>
+            <a:endParaRPr lang="zh-TW" altLang="en-US" sz="4200" dirty="0"/>
+          </a:p>
+        </p:txBody>
+      </p:sp>
+      <p:pic>
+        <p:nvPicPr>
+          <p:cNvPr id="1026" name="Picture 2" descr="C:\Users\jcfan\Desktop\term-project\homework\hw9\9-1\code\directCoding\classDiagram.png"/>
+          <p:cNvPicPr>
+            <a:picLocks noChangeAspect="1" noChangeArrowheads="1"/>
+          </p:cNvPicPr>
+          <p:nvPr/>
+        </p:nvPicPr>
+        <p:blipFill>
+          <a:blip r:embed="rId2">
+            <a:extLst>
+              <a:ext uri="{28A0092B-C50C-407E-A947-70E740481C1C}">
+                <a14:useLocalDpi xmlns:a14="http://schemas.microsoft.com/office/drawing/2010/main" val="0"/>
+              </a:ext>
+            </a:extLst>
+          </a:blip>
+          <a:srcRect/>
+          <a:stretch>
+            <a:fillRect/>
+          </a:stretch>
+        </p:blipFill>
+        <p:spPr bwMode="auto">
+          <a:xfrm>
+            <a:off x="971600" y="1628799"/>
+            <a:ext cx="6984776" cy="4787623"/>
+          </a:xfrm>
+          <a:prstGeom prst="rect">
+            <a:avLst/>
+          </a:prstGeom>
+          <a:noFill/>
+          <a:extLst>
+            <a:ext uri="{909E8E84-426E-40DD-AFC4-6F175D3DCCD1}">
+              <a14:hiddenFill xmlns:a14="http://schemas.microsoft.com/office/drawing/2010/main">
+                <a:solidFill>
+                  <a:srgbClr val="FFFFFF"/>
+                </a:solidFill>
+              </a14:hiddenFill>
+            </a:ext>
+          </a:extLst>
+        </p:spPr>
+      </p:pic>
+    </p:spTree>
+    <p:extLst>
+      <p:ext uri="{BB962C8B-B14F-4D97-AF65-F5344CB8AC3E}">
+        <p14:creationId xmlns:p14="http://schemas.microsoft.com/office/powerpoint/2010/main" val="414891082"/>
+      </p:ext>
+    </p:extLst>
+  </p:cSld>
+  <p:clrMapOvr>
+    <a:masterClrMapping/>
+  </p:clrMapOvr>
+</p:sld>
+</file>
+
+<file path=ppt/slides/slide3.xml><?xml version="1.0" encoding="utf-8"?>
+<p:sld xmlns:a="http://schemas.openxmlformats.org/drawingml/2006/main" xmlns:r="http://schemas.openxmlformats.org/officeDocument/2006/relationships" xmlns:p="http://schemas.openxmlformats.org/presentationml/2006/main">
+  <p:cSld>
+    <p:spTree>
+      <p:nvGrpSpPr>
+        <p:cNvPr id="1" name=""/>
+        <p:cNvGrpSpPr/>
+        <p:nvPr/>
+      </p:nvGrpSpPr>
+      <p:grpSpPr>
+        <a:xfrm>
+          <a:off x="0" y="0"/>
+          <a:ext cx="0" cy="0"/>
+          <a:chOff x="0" y="0"/>
+          <a:chExt cx="0" cy="0"/>
+        </a:xfrm>
+      </p:grpSpPr>
+      <p:sp>
+        <p:nvSpPr>
+          <p:cNvPr id="2" name="標題 1"/>
+          <p:cNvSpPr>
+            <a:spLocks noGrp="1"/>
+          </p:cNvSpPr>
+          <p:nvPr>
+            <p:ph type="title"/>
+          </p:nvPr>
+        </p:nvSpPr>
+        <p:spPr/>
+        <p:txBody>
+          <a:bodyPr>
+            <a:normAutofit/>
+          </a:bodyPr>
+          <a:lstStyle/>
+          <a:p>
             <a:pPr algn="l"/>
             <a:r>
-              <a:rPr lang="en-US" altLang="zh-TW" sz="2400" dirty="0" smtClean="0">
+              <a:rPr lang="en-US" altLang="zh-TW" sz="4200" dirty="0" smtClean="0">
                 <a:latin typeface="Times New Roman" panose="02020603050405020304" pitchFamily="18" charset="0"/>
                 <a:cs typeface="Times New Roman" panose="02020603050405020304" pitchFamily="18" charset="0"/>
               </a:rPr>
-              <a:t>We have a </a:t>
-            </a:r>
-            <a:r>
-              <a:rPr lang="en-US" altLang="zh-TW" sz="2400" dirty="0" err="1" smtClean="0">
-                <a:latin typeface="Times New Roman" panose="02020603050405020304" pitchFamily="18" charset="0"/>
-                <a:cs typeface="Times New Roman" panose="02020603050405020304" pitchFamily="18" charset="0"/>
-              </a:rPr>
-              <a:t>TextView</a:t>
-            </a:r>
-            <a:r>
-              <a:rPr lang="en-US" altLang="zh-TW" sz="2400" dirty="0" smtClean="0">
-                <a:latin typeface="Times New Roman" panose="02020603050405020304" pitchFamily="18" charset="0"/>
-                <a:cs typeface="Times New Roman" panose="02020603050405020304" pitchFamily="18" charset="0"/>
-              </a:rPr>
-              <a:t> object that displays text in a window.</a:t>
-            </a:r>
-            <a:endParaRPr lang="zh-TW" altLang="en-US" sz="2400" dirty="0">
+              <a:t>Initial Design</a:t>
+            </a:r>
+            <a:endParaRPr lang="zh-TW" altLang="en-US" sz="4200" dirty="0">
               <a:latin typeface="Times New Roman" panose="02020603050405020304" pitchFamily="18" charset="0"/>
               <a:cs typeface="Times New Roman" panose="02020603050405020304" pitchFamily="18" charset="0"/>
             </a:endParaRPr>
@@ -3940,7 +4023,7 @@
         </p:nvGrpSpPr>
         <p:grpSpPr>
           <a:xfrm>
-            <a:off x="611560" y="2183405"/>
+            <a:off x="611560" y="2956909"/>
             <a:ext cx="1656184" cy="1420002"/>
             <a:chOff x="1907704" y="2183405"/>
             <a:chExt cx="1656184" cy="1420002"/>
@@ -4185,7 +4268,7 @@
         </p:nvGrpSpPr>
         <p:grpSpPr>
           <a:xfrm>
-            <a:off x="3419872" y="2183405"/>
+            <a:off x="3419872" y="2956909"/>
             <a:ext cx="1656184" cy="1420002"/>
             <a:chOff x="4499992" y="2183405"/>
             <a:chExt cx="1656184" cy="1420002"/>
@@ -4447,7 +4530,7 @@
         </p:nvCxnSpPr>
         <p:spPr>
           <a:xfrm>
-            <a:off x="2267744" y="2801737"/>
+            <a:off x="2267744" y="3575241"/>
             <a:ext cx="1152128" cy="0"/>
           </a:xfrm>
           <a:prstGeom prst="straightConnector1">
@@ -4483,7 +4566,7 @@
         </p:nvSpPr>
         <p:spPr>
           <a:xfrm>
-            <a:off x="3066474" y="2453011"/>
+            <a:off x="3066474" y="3226515"/>
             <a:ext cx="288032" cy="338554"/>
           </a:xfrm>
           <a:prstGeom prst="rect">
@@ -4519,7 +4602,7 @@
         </p:nvSpPr>
         <p:spPr>
           <a:xfrm>
-            <a:off x="2278385" y="2463183"/>
+            <a:off x="2278385" y="3236687"/>
             <a:ext cx="288032" cy="338554"/>
           </a:xfrm>
           <a:prstGeom prst="rect">
@@ -4557,7 +4640,7 @@
         </p:nvCxnSpPr>
         <p:spPr>
           <a:xfrm flipH="1" flipV="1">
-            <a:off x="4247964" y="3336184"/>
+            <a:off x="4247964" y="4109688"/>
             <a:ext cx="1236028" cy="102108"/>
           </a:xfrm>
           <a:prstGeom prst="line">
@@ -4593,7 +4676,7 @@
         </p:nvSpPr>
         <p:spPr>
           <a:xfrm>
-            <a:off x="5483992" y="3068960"/>
+            <a:off x="5483992" y="3842464"/>
             <a:ext cx="1536279" cy="738664"/>
           </a:xfrm>
           <a:prstGeom prst="rect">
@@ -4629,6 +4712,73 @@
               <a:t>}</a:t>
             </a:r>
             <a:endParaRPr lang="en-US" altLang="zh-TW" sz="1400" dirty="0" smtClean="0"/>
+          </a:p>
+        </p:txBody>
+      </p:sp>
+      <p:sp>
+        <p:nvSpPr>
+          <p:cNvPr id="16" name="標題 1"/>
+          <p:cNvSpPr txBox="1">
+            <a:spLocks/>
+          </p:cNvSpPr>
+          <p:nvPr/>
+        </p:nvSpPr>
+        <p:spPr>
+          <a:xfrm>
+            <a:off x="467544" y="1484784"/>
+            <a:ext cx="8229600" cy="1143000"/>
+          </a:xfrm>
+          <a:prstGeom prst="rect">
+            <a:avLst/>
+          </a:prstGeom>
+        </p:spPr>
+        <p:txBody>
+          <a:bodyPr vert="horz" lIns="91440" tIns="45720" rIns="91440" bIns="45720" rtlCol="0" anchor="ctr">
+            <a:normAutofit/>
+          </a:bodyPr>
+          <a:lstStyle>
+            <a:lvl1pPr algn="ctr" defTabSz="914400" rtl="0" eaLnBrk="1" latinLnBrk="0" hangingPunct="1">
+              <a:spcBef>
+                <a:spcPct val="0"/>
+              </a:spcBef>
+              <a:buNone/>
+              <a:defRPr sz="4400" kern="1200">
+                <a:solidFill>
+                  <a:schemeClr val="tx1"/>
+                </a:solidFill>
+                <a:latin typeface="+mj-lt"/>
+                <a:ea typeface="+mj-ea"/>
+                <a:cs typeface="+mj-cs"/>
+              </a:defRPr>
+            </a:lvl1pPr>
+          </a:lstStyle>
+          <a:p>
+            <a:pPr algn="l"/>
+            <a:r>
+              <a:rPr lang="en-US" altLang="zh-TW" sz="2400" dirty="0" smtClean="0">
+                <a:latin typeface="Times New Roman" panose="02020603050405020304" pitchFamily="18" charset="0"/>
+                <a:cs typeface="Times New Roman" panose="02020603050405020304" pitchFamily="18" charset="0"/>
+              </a:rPr>
+              <a:t>We have a </a:t>
+            </a:r>
+            <a:r>
+              <a:rPr lang="en-US" altLang="zh-TW" sz="2400" dirty="0" err="1" smtClean="0">
+                <a:latin typeface="Times New Roman" panose="02020603050405020304" pitchFamily="18" charset="0"/>
+                <a:cs typeface="Times New Roman" panose="02020603050405020304" pitchFamily="18" charset="0"/>
+              </a:rPr>
+              <a:t>TextView</a:t>
+            </a:r>
+            <a:r>
+              <a:rPr lang="en-US" altLang="zh-TW" sz="2400" dirty="0" smtClean="0">
+                <a:latin typeface="Times New Roman" panose="02020603050405020304" pitchFamily="18" charset="0"/>
+                <a:cs typeface="Times New Roman" panose="02020603050405020304" pitchFamily="18" charset="0"/>
+              </a:rPr>
+              <a:t> object that displays text in a window.</a:t>
+            </a:r>
+            <a:endParaRPr lang="zh-TW" altLang="en-US" sz="2400" dirty="0">
+              <a:latin typeface="Times New Roman" panose="02020603050405020304" pitchFamily="18" charset="0"/>
+              <a:cs typeface="Times New Roman" panose="02020603050405020304" pitchFamily="18" charset="0"/>
+            </a:endParaRPr>
           </a:p>
         </p:txBody>
       </p:sp>
@@ -4652,7 +4802,7 @@
 </p:sld>
 </file>
 
-<file path=ppt/slides/slide3.xml><?xml version="1.0" encoding="utf-8"?>
+<file path=ppt/slides/slide4.xml><?xml version="1.0" encoding="utf-8"?>
 <p:sld xmlns:a="http://schemas.openxmlformats.org/drawingml/2006/main" xmlns:r="http://schemas.openxmlformats.org/officeDocument/2006/relationships" xmlns:p="http://schemas.openxmlformats.org/presentationml/2006/main">
   <p:cSld>
     <p:spTree>
@@ -5937,7 +6087,7 @@
 </p:sld>
 </file>
 
-<file path=ppt/slides/slide4.xml><?xml version="1.0" encoding="utf-8"?>
+<file path=ppt/slides/slide5.xml><?xml version="1.0" encoding="utf-8"?>
 <p:sld xmlns:a="http://schemas.openxmlformats.org/drawingml/2006/main" xmlns:r="http://schemas.openxmlformats.org/officeDocument/2006/relationships" xmlns:p="http://schemas.openxmlformats.org/presentationml/2006/main">
   <p:cSld>
     <p:spTree>
@@ -7978,7 +8128,7 @@
 </p:sld>
 </file>
 
-<file path=ppt/slides/slide5.xml><?xml version="1.0" encoding="utf-8"?>
+<file path=ppt/slides/slide6.xml><?xml version="1.0" encoding="utf-8"?>
 <p:sld xmlns:a="http://schemas.openxmlformats.org/drawingml/2006/main" xmlns:r="http://schemas.openxmlformats.org/officeDocument/2006/relationships" xmlns:p="http://schemas.openxmlformats.org/presentationml/2006/main">
   <p:cSld>
     <p:spTree>
@@ -10183,7 +10333,7 @@
 </p:sld>
 </file>
 
-<file path=ppt/slides/slide6.xml><?xml version="1.0" encoding="utf-8"?>
+<file path=ppt/slides/slide7.xml><?xml version="1.0" encoding="utf-8"?>
 <p:sld xmlns:a="http://schemas.openxmlformats.org/drawingml/2006/main" xmlns:r="http://schemas.openxmlformats.org/officeDocument/2006/relationships" xmlns:p="http://schemas.openxmlformats.org/presentationml/2006/main">
   <p:cSld>
     <p:spTree>
@@ -10208,7 +10358,7 @@
         </p:nvGrpSpPr>
         <p:grpSpPr>
           <a:xfrm>
-            <a:off x="401473" y="1616488"/>
+            <a:off x="401473" y="2588935"/>
             <a:ext cx="2736305" cy="2195975"/>
             <a:chOff x="4499992" y="2183405"/>
             <a:chExt cx="1656184" cy="2195975"/>
@@ -10599,7 +10749,7 @@
         </p:nvSpPr>
         <p:spPr>
           <a:xfrm>
-            <a:off x="395536" y="332656"/>
+            <a:off x="395536" y="1268760"/>
             <a:ext cx="8229600" cy="936104"/>
           </a:xfrm>
         </p:spPr>
@@ -10611,11 +10761,11 @@
           <a:p>
             <a:pPr algn="l"/>
             <a:r>
-              <a:rPr lang="en-US" altLang="zh-TW" sz="2400" dirty="0" err="1" smtClean="0">
+              <a:rPr lang="en-US" altLang="zh-TW" sz="2400" dirty="0" smtClean="0">
                 <a:latin typeface="Times New Roman" panose="02020603050405020304" pitchFamily="18" charset="0"/>
                 <a:cs typeface="Times New Roman" panose="02020603050405020304" pitchFamily="18" charset="0"/>
               </a:rPr>
-              <a:t>Encapulation</a:t>
+              <a:t>Encapsulation</a:t>
             </a:r>
             <a:endParaRPr lang="zh-TW" altLang="en-US" sz="2400" dirty="0">
               <a:latin typeface="Times New Roman" panose="02020603050405020304" pitchFamily="18" charset="0"/>
@@ -10632,7 +10782,7 @@
         </p:nvSpPr>
         <p:spPr>
           <a:xfrm>
-            <a:off x="4283968" y="1815970"/>
+            <a:off x="4283968" y="2788417"/>
             <a:ext cx="2801670" cy="1815882"/>
           </a:xfrm>
           <a:prstGeom prst="rect">
@@ -10744,7 +10894,7 @@
         </p:nvCxnSpPr>
         <p:spPr>
           <a:xfrm flipH="1">
-            <a:off x="2915816" y="2723911"/>
+            <a:off x="2915816" y="3696358"/>
             <a:ext cx="1368152" cy="649431"/>
           </a:xfrm>
           <a:prstGeom prst="line">
@@ -10780,7 +10930,7 @@
         </p:nvSpPr>
         <p:spPr>
           <a:xfrm>
-            <a:off x="5164453" y="2557994"/>
+            <a:off x="5164453" y="3530441"/>
             <a:ext cx="1607691" cy="199573"/>
           </a:xfrm>
           <a:prstGeom prst="rect">
@@ -10829,7 +10979,7 @@
         </p:nvSpPr>
         <p:spPr>
           <a:xfrm>
-            <a:off x="5173600" y="2957273"/>
+            <a:off x="5173600" y="3929720"/>
             <a:ext cx="1607691" cy="199573"/>
           </a:xfrm>
           <a:prstGeom prst="rect">
@@ -10878,7 +11028,7 @@
         </p:nvGrpSpPr>
         <p:grpSpPr>
           <a:xfrm>
-            <a:off x="3969064" y="4400769"/>
+            <a:off x="3969064" y="5373216"/>
             <a:ext cx="1461095" cy="1080120"/>
             <a:chOff x="1907704" y="2183405"/>
             <a:chExt cx="1656184" cy="1080120"/>
@@ -11092,7 +11242,7 @@
         </p:nvGrpSpPr>
         <p:grpSpPr>
           <a:xfrm>
-            <a:off x="6300192" y="4373876"/>
+            <a:off x="6300192" y="5346323"/>
             <a:ext cx="1461095" cy="1080120"/>
             <a:chOff x="1907704" y="2183405"/>
             <a:chExt cx="1656184" cy="1080120"/>
@@ -11309,7 +11459,7 @@
         </p:nvCxnSpPr>
         <p:spPr>
           <a:xfrm flipH="1">
-            <a:off x="4699612" y="2657781"/>
+            <a:off x="4699612" y="3630228"/>
             <a:ext cx="464841" cy="1742988"/>
           </a:xfrm>
           <a:prstGeom prst="straightConnector1">
@@ -11350,7 +11500,7 @@
         </p:nvCxnSpPr>
         <p:spPr>
           <a:xfrm>
-            <a:off x="5977446" y="3156846"/>
+            <a:off x="5977446" y="4129293"/>
             <a:ext cx="1053294" cy="1217030"/>
           </a:xfrm>
           <a:prstGeom prst="straightConnector1">
@@ -11381,6 +11531,59 @@
           </a:fontRef>
         </p:style>
       </p:cxnSp>
+      <p:sp>
+        <p:nvSpPr>
+          <p:cNvPr id="21" name="標題 1"/>
+          <p:cNvSpPr txBox="1">
+            <a:spLocks/>
+          </p:cNvSpPr>
+          <p:nvPr/>
+        </p:nvSpPr>
+        <p:spPr>
+          <a:xfrm>
+            <a:off x="395536" y="332656"/>
+            <a:ext cx="8229600" cy="936104"/>
+          </a:xfrm>
+          <a:prstGeom prst="rect">
+            <a:avLst/>
+          </a:prstGeom>
+        </p:spPr>
+        <p:txBody>
+          <a:bodyPr vert="horz" lIns="91440" tIns="45720" rIns="91440" bIns="45720" rtlCol="0" anchor="ctr">
+            <a:normAutofit/>
+          </a:bodyPr>
+          <a:lstStyle>
+            <a:lvl1pPr algn="ctr" defTabSz="914400" rtl="0" eaLnBrk="1" latinLnBrk="0" hangingPunct="1">
+              <a:spcBef>
+                <a:spcPct val="0"/>
+              </a:spcBef>
+              <a:buNone/>
+              <a:defRPr sz="4400" kern="1200">
+                <a:solidFill>
+                  <a:schemeClr val="tx1"/>
+                </a:solidFill>
+                <a:latin typeface="+mj-lt"/>
+                <a:ea typeface="+mj-ea"/>
+                <a:cs typeface="+mj-cs"/>
+              </a:defRPr>
+            </a:lvl1pPr>
+          </a:lstStyle>
+          <a:p>
+            <a:pPr algn="l"/>
+            <a:r>
+              <a:rPr lang="en-US" altLang="zh-TW" sz="4200" dirty="0" smtClean="0">
+                <a:latin typeface="Times New Roman" panose="02020603050405020304" pitchFamily="18" charset="0"/>
+                <a:cs typeface="Times New Roman" panose="02020603050405020304" pitchFamily="18" charset="0"/>
+              </a:rPr>
+              <a:t>Redesign</a:t>
+            </a:r>
+            <a:endParaRPr lang="zh-TW" altLang="en-US" sz="4200" dirty="0">
+              <a:latin typeface="Times New Roman" panose="02020603050405020304" pitchFamily="18" charset="0"/>
+              <a:cs typeface="Times New Roman" panose="02020603050405020304" pitchFamily="18" charset="0"/>
+            </a:endParaRPr>
+          </a:p>
+        </p:txBody>
+      </p:sp>
     </p:spTree>
     <p:extLst>
       <p:ext uri="{BB962C8B-B14F-4D97-AF65-F5344CB8AC3E}">
@@ -11401,7 +11604,7 @@
 </p:sld>
 </file>
 
-<file path=ppt/slides/slide7.xml><?xml version="1.0" encoding="utf-8"?>
+<file path=ppt/slides/slide8.xml><?xml version="1.0" encoding="utf-8"?>
 <p:sld xmlns:a="http://schemas.openxmlformats.org/drawingml/2006/main" xmlns:r="http://schemas.openxmlformats.org/officeDocument/2006/relationships" xmlns:p="http://schemas.openxmlformats.org/presentationml/2006/main">
   <p:cSld>
     <p:spTree>
@@ -13273,7 +13476,7 @@
 </p:sld>
 </file>
 
-<file path=ppt/slides/slide8.xml><?xml version="1.0" encoding="utf-8"?>
+<file path=ppt/slides/slide9.xml><?xml version="1.0" encoding="utf-8"?>
 <p:sld xmlns:a="http://schemas.openxmlformats.org/drawingml/2006/main" xmlns:r="http://schemas.openxmlformats.org/officeDocument/2006/relationships" xmlns:p="http://schemas.openxmlformats.org/presentationml/2006/main">
   <p:cSld>
     <p:spTree>

</xml_diff>